<commit_message>
started to add like and dislike
</commit_message>
<xml_diff>
--- a/ProjectGallery - защита.pptx
+++ b/ProjectGallery - защита.pptx
@@ -12518,6 +12518,42 @@
           </a:p>
         </p:txBody>
       </p:sp>
+      <p:pic>
+        <p:nvPicPr>
+          <p:cNvPr id="5" name="Рисунок 4">
+            <a:extLst>
+              <a:ext uri="{FF2B5EF4-FFF2-40B4-BE49-F238E27FC236}">
+                <a16:creationId xmlns:a16="http://schemas.microsoft.com/office/drawing/2014/main" id="{5B597956-7B24-40FE-B537-B7D3DAF8D083}"/>
+              </a:ext>
+            </a:extLst>
+          </p:cNvPr>
+          <p:cNvPicPr>
+            <a:picLocks noChangeAspect="1"/>
+          </p:cNvPicPr>
+          <p:nvPr/>
+        </p:nvPicPr>
+        <p:blipFill>
+          <a:blip r:embed="rId2">
+            <a:extLst>
+              <a:ext uri="{28A0092B-C50C-407E-A947-70E740481C1C}">
+                <a14:useLocalDpi xmlns:a14="http://schemas.microsoft.com/office/drawing/2010/main" val="0"/>
+              </a:ext>
+            </a:extLst>
+          </a:blip>
+          <a:stretch>
+            <a:fillRect/>
+          </a:stretch>
+        </p:blipFill>
+        <p:spPr>
+          <a:xfrm>
+            <a:off x="9451549" y="0"/>
+            <a:ext cx="2740451" cy="1370226"/>
+          </a:xfrm>
+          <a:prstGeom prst="rect">
+            <a:avLst/>
+          </a:prstGeom>
+        </p:spPr>
+      </p:pic>
     </p:spTree>
     <p:extLst>
       <p:ext uri="{BB962C8B-B14F-4D97-AF65-F5344CB8AC3E}">
@@ -12621,6 +12657,42 @@
           </a:p>
         </p:txBody>
       </p:sp>
+      <p:pic>
+        <p:nvPicPr>
+          <p:cNvPr id="4" name="Рисунок 3">
+            <a:extLst>
+              <a:ext uri="{FF2B5EF4-FFF2-40B4-BE49-F238E27FC236}">
+                <a16:creationId xmlns:a16="http://schemas.microsoft.com/office/drawing/2014/main" id="{59CC1EB5-204E-4737-89D4-DF939CB7D4BD}"/>
+              </a:ext>
+            </a:extLst>
+          </p:cNvPr>
+          <p:cNvPicPr>
+            <a:picLocks noChangeAspect="1"/>
+          </p:cNvPicPr>
+          <p:nvPr/>
+        </p:nvPicPr>
+        <p:blipFill>
+          <a:blip r:embed="rId2">
+            <a:extLst>
+              <a:ext uri="{28A0092B-C50C-407E-A947-70E740481C1C}">
+                <a14:useLocalDpi xmlns:a14="http://schemas.microsoft.com/office/drawing/2010/main" val="0"/>
+              </a:ext>
+            </a:extLst>
+          </a:blip>
+          <a:stretch>
+            <a:fillRect/>
+          </a:stretch>
+        </p:blipFill>
+        <p:spPr>
+          <a:xfrm>
+            <a:off x="9451549" y="0"/>
+            <a:ext cx="2740451" cy="1370226"/>
+          </a:xfrm>
+          <a:prstGeom prst="rect">
+            <a:avLst/>
+          </a:prstGeom>
+        </p:spPr>
+      </p:pic>
     </p:spTree>
     <p:extLst>
       <p:ext uri="{BB962C8B-B14F-4D97-AF65-F5344CB8AC3E}">
@@ -12735,6 +12807,42 @@
           </a:p>
         </p:txBody>
       </p:sp>
+      <p:pic>
+        <p:nvPicPr>
+          <p:cNvPr id="4" name="Рисунок 3">
+            <a:extLst>
+              <a:ext uri="{FF2B5EF4-FFF2-40B4-BE49-F238E27FC236}">
+                <a16:creationId xmlns:a16="http://schemas.microsoft.com/office/drawing/2014/main" id="{E233AF1B-220B-4791-870A-414F9D2F3524}"/>
+              </a:ext>
+            </a:extLst>
+          </p:cNvPr>
+          <p:cNvPicPr>
+            <a:picLocks noChangeAspect="1"/>
+          </p:cNvPicPr>
+          <p:nvPr/>
+        </p:nvPicPr>
+        <p:blipFill>
+          <a:blip r:embed="rId2">
+            <a:extLst>
+              <a:ext uri="{28A0092B-C50C-407E-A947-70E740481C1C}">
+                <a14:useLocalDpi xmlns:a14="http://schemas.microsoft.com/office/drawing/2010/main" val="0"/>
+              </a:ext>
+            </a:extLst>
+          </a:blip>
+          <a:stretch>
+            <a:fillRect/>
+          </a:stretch>
+        </p:blipFill>
+        <p:spPr>
+          <a:xfrm>
+            <a:off x="9451549" y="0"/>
+            <a:ext cx="2740451" cy="1370226"/>
+          </a:xfrm>
+          <a:prstGeom prst="rect">
+            <a:avLst/>
+          </a:prstGeom>
+        </p:spPr>
+      </p:pic>
     </p:spTree>
     <p:extLst>
       <p:ext uri="{BB962C8B-B14F-4D97-AF65-F5344CB8AC3E}">
@@ -12827,6 +12935,42 @@
           </a:p>
         </p:txBody>
       </p:sp>
+      <p:pic>
+        <p:nvPicPr>
+          <p:cNvPr id="4" name="Рисунок 3">
+            <a:extLst>
+              <a:ext uri="{FF2B5EF4-FFF2-40B4-BE49-F238E27FC236}">
+                <a16:creationId xmlns:a16="http://schemas.microsoft.com/office/drawing/2014/main" id="{11C6456B-086B-462E-9D44-1FF6562A6D94}"/>
+              </a:ext>
+            </a:extLst>
+          </p:cNvPr>
+          <p:cNvPicPr>
+            <a:picLocks noChangeAspect="1"/>
+          </p:cNvPicPr>
+          <p:nvPr/>
+        </p:nvPicPr>
+        <p:blipFill>
+          <a:blip r:embed="rId2">
+            <a:extLst>
+              <a:ext uri="{28A0092B-C50C-407E-A947-70E740481C1C}">
+                <a14:useLocalDpi xmlns:a14="http://schemas.microsoft.com/office/drawing/2010/main" val="0"/>
+              </a:ext>
+            </a:extLst>
+          </a:blip>
+          <a:stretch>
+            <a:fillRect/>
+          </a:stretch>
+        </p:blipFill>
+        <p:spPr>
+          <a:xfrm>
+            <a:off x="9451549" y="0"/>
+            <a:ext cx="2740451" cy="1370226"/>
+          </a:xfrm>
+          <a:prstGeom prst="rect">
+            <a:avLst/>
+          </a:prstGeom>
+        </p:spPr>
+      </p:pic>
     </p:spTree>
     <p:extLst>
       <p:ext uri="{BB962C8B-B14F-4D97-AF65-F5344CB8AC3E}">
@@ -12913,6 +13057,42 @@
           </a:p>
         </p:txBody>
       </p:sp>
+      <p:pic>
+        <p:nvPicPr>
+          <p:cNvPr id="4" name="Рисунок 3">
+            <a:extLst>
+              <a:ext uri="{FF2B5EF4-FFF2-40B4-BE49-F238E27FC236}">
+                <a16:creationId xmlns:a16="http://schemas.microsoft.com/office/drawing/2014/main" id="{4E0F0E33-BE86-4C23-934D-EF2CE9C009D6}"/>
+              </a:ext>
+            </a:extLst>
+          </p:cNvPr>
+          <p:cNvPicPr>
+            <a:picLocks noChangeAspect="1"/>
+          </p:cNvPicPr>
+          <p:nvPr/>
+        </p:nvPicPr>
+        <p:blipFill>
+          <a:blip r:embed="rId2">
+            <a:extLst>
+              <a:ext uri="{28A0092B-C50C-407E-A947-70E740481C1C}">
+                <a14:useLocalDpi xmlns:a14="http://schemas.microsoft.com/office/drawing/2010/main" val="0"/>
+              </a:ext>
+            </a:extLst>
+          </a:blip>
+          <a:stretch>
+            <a:fillRect/>
+          </a:stretch>
+        </p:blipFill>
+        <p:spPr>
+          <a:xfrm>
+            <a:off x="9451549" y="0"/>
+            <a:ext cx="2740451" cy="1370226"/>
+          </a:xfrm>
+          <a:prstGeom prst="rect">
+            <a:avLst/>
+          </a:prstGeom>
+        </p:spPr>
+      </p:pic>
     </p:spTree>
     <p:extLst>
       <p:ext uri="{BB962C8B-B14F-4D97-AF65-F5344CB8AC3E}">
@@ -13101,6 +13281,42 @@
           </a:p>
         </p:txBody>
       </p:sp>
+      <p:pic>
+        <p:nvPicPr>
+          <p:cNvPr id="4" name="Рисунок 3">
+            <a:extLst>
+              <a:ext uri="{FF2B5EF4-FFF2-40B4-BE49-F238E27FC236}">
+                <a16:creationId xmlns:a16="http://schemas.microsoft.com/office/drawing/2014/main" id="{F20DE642-DEE5-4201-8CAF-686F26BAAD19}"/>
+              </a:ext>
+            </a:extLst>
+          </p:cNvPr>
+          <p:cNvPicPr>
+            <a:picLocks noChangeAspect="1"/>
+          </p:cNvPicPr>
+          <p:nvPr/>
+        </p:nvPicPr>
+        <p:blipFill>
+          <a:blip r:embed="rId2">
+            <a:extLst>
+              <a:ext uri="{28A0092B-C50C-407E-A947-70E740481C1C}">
+                <a14:useLocalDpi xmlns:a14="http://schemas.microsoft.com/office/drawing/2010/main" val="0"/>
+              </a:ext>
+            </a:extLst>
+          </a:blip>
+          <a:stretch>
+            <a:fillRect/>
+          </a:stretch>
+        </p:blipFill>
+        <p:spPr>
+          <a:xfrm>
+            <a:off x="9451549" y="0"/>
+            <a:ext cx="2740451" cy="1370226"/>
+          </a:xfrm>
+          <a:prstGeom prst="rect">
+            <a:avLst/>
+          </a:prstGeom>
+        </p:spPr>
+      </p:pic>
     </p:spTree>
     <p:extLst>
       <p:ext uri="{BB962C8B-B14F-4D97-AF65-F5344CB8AC3E}">
@@ -13199,6 +13415,42 @@
           </a:p>
         </p:txBody>
       </p:sp>
+      <p:pic>
+        <p:nvPicPr>
+          <p:cNvPr id="4" name="Рисунок 3">
+            <a:extLst>
+              <a:ext uri="{FF2B5EF4-FFF2-40B4-BE49-F238E27FC236}">
+                <a16:creationId xmlns:a16="http://schemas.microsoft.com/office/drawing/2014/main" id="{1548B75F-0EE5-4FEF-AC5C-2C546AD9614A}"/>
+              </a:ext>
+            </a:extLst>
+          </p:cNvPr>
+          <p:cNvPicPr>
+            <a:picLocks noChangeAspect="1"/>
+          </p:cNvPicPr>
+          <p:nvPr/>
+        </p:nvPicPr>
+        <p:blipFill>
+          <a:blip r:embed="rId2">
+            <a:extLst>
+              <a:ext uri="{28A0092B-C50C-407E-A947-70E740481C1C}">
+                <a14:useLocalDpi xmlns:a14="http://schemas.microsoft.com/office/drawing/2010/main" val="0"/>
+              </a:ext>
+            </a:extLst>
+          </a:blip>
+          <a:stretch>
+            <a:fillRect/>
+          </a:stretch>
+        </p:blipFill>
+        <p:spPr>
+          <a:xfrm>
+            <a:off x="9451549" y="0"/>
+            <a:ext cx="2740451" cy="1370226"/>
+          </a:xfrm>
+          <a:prstGeom prst="rect">
+            <a:avLst/>
+          </a:prstGeom>
+        </p:spPr>
+      </p:pic>
     </p:spTree>
     <p:extLst>
       <p:ext uri="{BB962C8B-B14F-4D97-AF65-F5344CB8AC3E}">

</xml_diff>